<commit_message>
Diagrama de componentes versão final (atualizado)
</commit_message>
<xml_diff>
--- a/documentacao/ArquiteturaDeSolucao/Diagrama_de_Componente_vFinal.pptx
+++ b/documentacao/ArquiteturaDeSolucao/Diagrama_de_Componente_vFinal.pptx
@@ -2845,8 +2845,8 @@
         </p:nvSpPr>
         <p:spPr>
           <a:xfrm>
-            <a:off x="2831254" y="258221"/>
-            <a:ext cx="1681582" cy="1147670"/>
+            <a:off x="3030020" y="258221"/>
+            <a:ext cx="1469537" cy="1147670"/>
           </a:xfrm>
           <a:prstGeom prst="rect">
             <a:avLst/>
@@ -3025,7 +3025,7 @@
           <a:p>
             <a:pPr algn="ctr"/>
             <a:r>
-              <a:rPr lang="pt-BR" sz="1100" dirty="0">
+              <a:rPr lang="pt-BR" sz="1000" dirty="0">
                 <a:latin typeface="Corbel"/>
               </a:rPr>
               <a:t>Componente que gerencia as conexões e transações com o Banco de Dados</a:t>
@@ -3315,12 +3315,12 @@
         </p:nvCxnSpPr>
         <p:spPr>
           <a:xfrm rot="16200000" flipV="1">
-            <a:off x="3136461" y="1670764"/>
-            <a:ext cx="977667" cy="349721"/>
+            <a:off x="3156825" y="1691129"/>
+            <a:ext cx="917429" cy="369230"/>
           </a:xfrm>
           <a:prstGeom prst="bentConnector3">
             <a:avLst>
-              <a:gd name="adj1" fmla="val 31295"/>
+              <a:gd name="adj1" fmla="val 33757"/>
             </a:avLst>
           </a:prstGeom>
           <a:ln w="38100">
@@ -3367,7 +3367,7 @@
         <p:spPr>
           <a:xfrm rot="10800000" flipV="1">
             <a:off x="1505930" y="832055"/>
-            <a:ext cx="1325324" cy="1515"/>
+            <a:ext cx="1524090" cy="1515"/>
           </a:xfrm>
           <a:prstGeom prst="bentConnector3">
             <a:avLst>
@@ -3446,8 +3446,8 @@
         </p:nvSpPr>
         <p:spPr>
           <a:xfrm>
-            <a:off x="6052960" y="2328771"/>
-            <a:ext cx="1428431" cy="1095936"/>
+            <a:off x="6090909" y="2331171"/>
+            <a:ext cx="1390482" cy="1093535"/>
           </a:xfrm>
           <a:prstGeom prst="rect">
             <a:avLst/>
@@ -3662,8 +3662,8 @@
         </p:nvSpPr>
         <p:spPr>
           <a:xfrm>
-            <a:off x="4549159" y="2334457"/>
-            <a:ext cx="1503795" cy="1095936"/>
+            <a:off x="4589014" y="2331171"/>
+            <a:ext cx="1463940" cy="1099222"/>
           </a:xfrm>
           <a:prstGeom prst="rect">
             <a:avLst/>
@@ -5292,8 +5292,8 @@
         </p:nvCxnSpPr>
         <p:spPr>
           <a:xfrm rot="16200000" flipV="1">
-            <a:off x="5140878" y="702473"/>
-            <a:ext cx="976126" cy="2276470"/>
+            <a:off x="5149165" y="694186"/>
+            <a:ext cx="978526" cy="2295444"/>
           </a:xfrm>
           <a:prstGeom prst="bentConnector2">
             <a:avLst/>

</xml_diff>